<commit_message>
update ppt first draft
</commit_message>
<xml_diff>
--- a/ppt-artifacts/go_k8s_data_pipeline_first_draft.pptx
+++ b/ppt-artifacts/go_k8s_data_pipeline_first_draft.pptx
@@ -43680,43 +43680,12 @@
           <a:chExt cx="0" cy="0"/>
         </a:xfrm>
       </p:grpSpPr>
-      <p:pic>
-        <p:nvPicPr>
-          <p:cNvPr id="5" name="Picture 4">
+      <p:sp>
+        <p:nvSpPr>
+          <p:cNvPr id="42" name="Rectangle 41">
             <a:extLst>
               <a:ext uri="{FF2B5EF4-FFF2-40B4-BE49-F238E27FC236}">
-                <a16:creationId xmlns:a16="http://schemas.microsoft.com/office/drawing/2014/main" id="{D63AA4D0-1A0A-6BD3-7BE6-A151A4FEADE0}"/>
-              </a:ext>
-            </a:extLst>
-          </p:cNvPr>
-          <p:cNvPicPr>
-            <a:picLocks noChangeAspect="1"/>
-          </p:cNvPicPr>
-          <p:nvPr/>
-        </p:nvPicPr>
-        <p:blipFill>
-          <a:blip r:embed="rId2"/>
-          <a:srcRect l="11380" r="-1" b="-1"/>
-          <a:stretch>
-            <a:fillRect/>
-          </a:stretch>
-        </p:blipFill>
-        <p:spPr>
-          <a:xfrm>
-            <a:off x="20" y="-7619"/>
-            <a:ext cx="9143979" cy="6887364"/>
-          </a:xfrm>
-          <a:prstGeom prst="rect">
-            <a:avLst/>
-          </a:prstGeom>
-        </p:spPr>
-      </p:pic>
-      <p:sp>
-        <p:nvSpPr>
-          <p:cNvPr id="9" name="Rectangle 8">
-            <a:extLst>
-              <a:ext uri="{FF2B5EF4-FFF2-40B4-BE49-F238E27FC236}">
-                <a16:creationId xmlns:a16="http://schemas.microsoft.com/office/drawing/2014/main" id="{4D60F200-5EB0-B223-2439-C96C67F0FEE1}"/>
+                <a16:creationId xmlns:a16="http://schemas.microsoft.com/office/drawing/2014/main" id="{22A397E7-BF60-45B2-84C7-B074B76C37A7}"/>
               </a:ext>
               <a:ext uri="{C183D7F6-B498-43B3-948B-1728B52AA6E4}">
                 <adec:decorative xmlns:adec="http://schemas.microsoft.com/office/drawing/2017/decorative" val="1"/>
@@ -43735,28 +43704,129 @@
           </p:nvPr>
         </p:nvSpPr>
         <p:spPr>
-          <a:xfrm rot="16200000">
-            <a:off x="2539219" y="271092"/>
-            <a:ext cx="4065561" cy="9144000"/>
+          <a:xfrm>
+            <a:off x="0" y="0"/>
+            <a:ext cx="9144000" cy="6858000"/>
           </a:xfrm>
           <a:prstGeom prst="rect">
             <a:avLst/>
           </a:prstGeom>
-          <a:gradFill flip="none" rotWithShape="1">
+          <a:solidFill>
+            <a:schemeClr val="tx1">
+              <a:lumMod val="95000"/>
+              <a:lumOff val="5000"/>
+            </a:schemeClr>
+          </a:solidFill>
+          <a:ln>
+            <a:noFill/>
+          </a:ln>
+        </p:spPr>
+        <p:style>
+          <a:lnRef idx="2">
+            <a:schemeClr val="accent1">
+              <a:shade val="50000"/>
+            </a:schemeClr>
+          </a:lnRef>
+          <a:fillRef idx="1">
+            <a:schemeClr val="accent1"/>
+          </a:fillRef>
+          <a:effectRef idx="0">
+            <a:schemeClr val="accent1"/>
+          </a:effectRef>
+          <a:fontRef idx="minor">
+            <a:schemeClr val="lt1"/>
+          </a:fontRef>
+        </p:style>
+        <p:txBody>
+          <a:bodyPr rtlCol="0" anchor="ctr"/>
+          <a:lstStyle/>
+          <a:p>
+            <a:pPr algn="ctr"/>
+            <a:endParaRPr lang="en-US" dirty="0"/>
+          </a:p>
+        </p:txBody>
+      </p:sp>
+      <p:pic>
+        <p:nvPicPr>
+          <p:cNvPr id="5" name="Picture 4" descr="Close-up of a blue and green corrugated pipe&#10;&#10;AI-generated content may be incorrect.">
+            <a:extLst>
+              <a:ext uri="{FF2B5EF4-FFF2-40B4-BE49-F238E27FC236}">
+                <a16:creationId xmlns:a16="http://schemas.microsoft.com/office/drawing/2014/main" id="{D63AA4D0-1A0A-6BD3-7BE6-A151A4FEADE0}"/>
+              </a:ext>
+            </a:extLst>
+          </p:cNvPr>
+          <p:cNvPicPr>
+            <a:picLocks noChangeAspect="1"/>
+          </p:cNvPicPr>
+          <p:nvPr/>
+        </p:nvPicPr>
+        <p:blipFill>
+          <a:blip r:embed="rId2">
+            <a:alphaModFix/>
+          </a:blip>
+          <a:srcRect l="15916" r="26355" b="-1"/>
+          <a:stretch>
+            <a:fillRect/>
+          </a:stretch>
+        </p:blipFill>
+        <p:spPr>
+          <a:xfrm>
+            <a:off x="3212926" y="10"/>
+            <a:ext cx="5931074" cy="6857992"/>
+          </a:xfrm>
+          <a:prstGeom prst="rect">
+            <a:avLst/>
+          </a:prstGeom>
+        </p:spPr>
+      </p:pic>
+      <p:sp>
+        <p:nvSpPr>
+          <p:cNvPr id="44" name="Rectangle 43">
+            <a:extLst>
+              <a:ext uri="{FF2B5EF4-FFF2-40B4-BE49-F238E27FC236}">
+                <a16:creationId xmlns:a16="http://schemas.microsoft.com/office/drawing/2014/main" id="{890DEF05-784E-4B61-89E4-04C4ECF4E5A0}"/>
+              </a:ext>
+              <a:ext uri="{C183D7F6-B498-43B3-948B-1728B52AA6E4}">
+                <adec:decorative xmlns:adec="http://schemas.microsoft.com/office/drawing/2017/decorative" val="1"/>
+              </a:ext>
+            </a:extLst>
+          </p:cNvPr>
+          <p:cNvSpPr>
+            <a:spLocks noGrp="1" noRot="1" noChangeAspect="1" noMove="1" noResize="1" noEditPoints="1" noAdjustHandles="1" noChangeArrowheads="1" noChangeShapeType="1" noTextEdit="1"/>
+          </p:cNvSpPr>
+          <p:nvPr>
+            <p:extLst>
+              <p:ext uri="{386F3935-93C4-4BCD-93E2-E3B085C9AB24}">
+                <p16:designElem xmlns:p16="http://schemas.microsoft.com/office/powerpoint/2015/main" val="1"/>
+              </p:ext>
+            </p:extLst>
+          </p:nvPr>
+        </p:nvSpPr>
+        <p:spPr>
+          <a:xfrm>
+            <a:off x="0" y="0"/>
+            <a:ext cx="9144000" cy="6858000"/>
+          </a:xfrm>
+          <a:prstGeom prst="rect">
+            <a:avLst/>
+          </a:prstGeom>
+          <a:gradFill>
             <a:gsLst>
-              <a:gs pos="17000">
-                <a:srgbClr val="000000">
-                  <a:alpha val="59000"/>
-                </a:srgbClr>
+              <a:gs pos="36000">
+                <a:schemeClr val="tx1">
+                  <a:lumMod val="95000"/>
+                  <a:lumOff val="5000"/>
+                </a:schemeClr>
               </a:gs>
-              <a:gs pos="100000">
-                <a:srgbClr val="000000">
+              <a:gs pos="81000">
+                <a:schemeClr val="tx1">
+                  <a:lumMod val="95000"/>
+                  <a:lumOff val="5000"/>
                   <a:alpha val="0"/>
-                </a:srgbClr>
+                </a:schemeClr>
               </a:gs>
             </a:gsLst>
             <a:lin ang="0" scaled="0"/>
-            <a:tileRect/>
           </a:gradFill>
           <a:ln>
             <a:noFill/>
@@ -43789,162 +43859,6 @@
       </p:sp>
       <p:sp>
         <p:nvSpPr>
-          <p:cNvPr id="11" name="Rectangle 10">
-            <a:extLst>
-              <a:ext uri="{FF2B5EF4-FFF2-40B4-BE49-F238E27FC236}">
-                <a16:creationId xmlns:a16="http://schemas.microsoft.com/office/drawing/2014/main" id="{F92CB243-67C5-E304-31A0-4D7D607BAFBA}"/>
-              </a:ext>
-              <a:ext uri="{C183D7F6-B498-43B3-948B-1728B52AA6E4}">
-                <adec:decorative xmlns:adec="http://schemas.microsoft.com/office/drawing/2017/decorative" val="1"/>
-              </a:ext>
-            </a:extLst>
-          </p:cNvPr>
-          <p:cNvSpPr>
-            <a:spLocks noGrp="1" noRot="1" noChangeAspect="1" noMove="1" noResize="1" noEditPoints="1" noAdjustHandles="1" noChangeArrowheads="1" noChangeShapeType="1" noTextEdit="1"/>
-          </p:cNvSpPr>
-          <p:nvPr>
-            <p:extLst>
-              <p:ext uri="{386F3935-93C4-4BCD-93E2-E3B085C9AB24}">
-                <p16:designElem xmlns:p16="http://schemas.microsoft.com/office/powerpoint/2015/main" val="1"/>
-              </p:ext>
-            </p:extLst>
-          </p:nvPr>
-        </p:nvSpPr>
-        <p:spPr>
-          <a:xfrm rot="5400000">
-            <a:off x="6714594" y="623125"/>
-            <a:ext cx="3067943" cy="1806455"/>
-          </a:xfrm>
-          <a:prstGeom prst="rect">
-            <a:avLst/>
-          </a:prstGeom>
-          <a:gradFill flip="none" rotWithShape="1">
-            <a:gsLst>
-              <a:gs pos="0">
-                <a:schemeClr val="accent2"/>
-              </a:gs>
-              <a:gs pos="51000">
-                <a:schemeClr val="accent2">
-                  <a:alpha val="0"/>
-                </a:schemeClr>
-              </a:gs>
-            </a:gsLst>
-            <a:path path="circle">
-              <a:fillToRect r="100000" b="100000"/>
-            </a:path>
-            <a:tileRect l="-100000" t="-100000"/>
-          </a:gradFill>
-          <a:ln w="12700" cap="flat" cmpd="sng" algn="ctr">
-            <a:noFill/>
-            <a:prstDash val="solid"/>
-            <a:miter lim="800000"/>
-          </a:ln>
-          <a:effectLst/>
-        </p:spPr>
-        <p:style>
-          <a:lnRef idx="2">
-            <a:schemeClr val="accent1">
-              <a:shade val="50000"/>
-            </a:schemeClr>
-          </a:lnRef>
-          <a:fillRef idx="1">
-            <a:schemeClr val="accent1"/>
-          </a:fillRef>
-          <a:effectRef idx="0">
-            <a:schemeClr val="accent1"/>
-          </a:effectRef>
-          <a:fontRef idx="minor">
-            <a:schemeClr val="lt1"/>
-          </a:fontRef>
-        </p:style>
-        <p:txBody>
-          <a:bodyPr rtlCol="0" anchor="ctr"/>
-          <a:lstStyle/>
-          <a:p>
-            <a:pPr algn="r"/>
-            <a:endParaRPr lang="en-US"/>
-          </a:p>
-        </p:txBody>
-      </p:sp>
-      <p:sp>
-        <p:nvSpPr>
-          <p:cNvPr id="13" name="Rectangle 12">
-            <a:extLst>
-              <a:ext uri="{FF2B5EF4-FFF2-40B4-BE49-F238E27FC236}">
-                <a16:creationId xmlns:a16="http://schemas.microsoft.com/office/drawing/2014/main" id="{11A95761-C93E-94BF-087D-D2A823789EAB}"/>
-              </a:ext>
-              <a:ext uri="{C183D7F6-B498-43B3-948B-1728B52AA6E4}">
-                <adec:decorative xmlns:adec="http://schemas.microsoft.com/office/drawing/2017/decorative" val="1"/>
-              </a:ext>
-            </a:extLst>
-          </p:cNvPr>
-          <p:cNvSpPr>
-            <a:spLocks noGrp="1" noRot="1" noChangeAspect="1" noMove="1" noResize="1" noEditPoints="1" noAdjustHandles="1" noChangeArrowheads="1" noChangeShapeType="1" noTextEdit="1"/>
-          </p:cNvSpPr>
-          <p:nvPr>
-            <p:extLst>
-              <p:ext uri="{386F3935-93C4-4BCD-93E2-E3B085C9AB24}">
-                <p16:designElem xmlns:p16="http://schemas.microsoft.com/office/powerpoint/2015/main" val="1"/>
-              </p:ext>
-            </p:extLst>
-          </p:nvPr>
-        </p:nvSpPr>
-        <p:spPr>
-          <a:xfrm flipV="1">
-            <a:off x="-7794" y="4172881"/>
-            <a:ext cx="5366057" cy="2702991"/>
-          </a:xfrm>
-          <a:prstGeom prst="rect">
-            <a:avLst/>
-          </a:prstGeom>
-          <a:gradFill flip="none" rotWithShape="1">
-            <a:gsLst>
-              <a:gs pos="0">
-                <a:schemeClr val="accent5"/>
-              </a:gs>
-              <a:gs pos="52000">
-                <a:schemeClr val="accent2">
-                  <a:alpha val="0"/>
-                </a:schemeClr>
-              </a:gs>
-            </a:gsLst>
-            <a:lin ang="4200000" scaled="0"/>
-            <a:tileRect/>
-          </a:gradFill>
-          <a:ln w="12700" cap="flat" cmpd="sng" algn="ctr">
-            <a:noFill/>
-            <a:prstDash val="solid"/>
-            <a:miter lim="800000"/>
-          </a:ln>
-          <a:effectLst/>
-        </p:spPr>
-        <p:style>
-          <a:lnRef idx="2">
-            <a:schemeClr val="accent1">
-              <a:shade val="50000"/>
-            </a:schemeClr>
-          </a:lnRef>
-          <a:fillRef idx="1">
-            <a:schemeClr val="accent1"/>
-          </a:fillRef>
-          <a:effectRef idx="0">
-            <a:schemeClr val="accent1"/>
-          </a:effectRef>
-          <a:fontRef idx="minor">
-            <a:schemeClr val="lt1"/>
-          </a:fontRef>
-        </p:style>
-        <p:txBody>
-          <a:bodyPr rtlCol="0" anchor="ctr"/>
-          <a:lstStyle/>
-          <a:p>
-            <a:pPr algn="r"/>
-            <a:endParaRPr lang="en-US"/>
-          </a:p>
-        </p:txBody>
-      </p:sp>
-      <p:sp>
-        <p:nvSpPr>
           <p:cNvPr id="2" name="Title 1"/>
           <p:cNvSpPr>
             <a:spLocks noGrp="1"/>
@@ -43955,8 +43869,8 @@
         </p:nvSpPr>
         <p:spPr>
           <a:xfrm>
-            <a:off x="644271" y="1936866"/>
-            <a:ext cx="3636783" cy="2839273"/>
+            <a:off x="546497" y="1115219"/>
+            <a:ext cx="4129087" cy="2387600"/>
           </a:xfrm>
         </p:spPr>
         <p:txBody>
@@ -43965,11 +43879,15 @@
           </a:bodyPr>
           <a:lstStyle/>
           <a:p>
-            <a:pPr algn="l"/>
+            <a:pPr algn="l">
+              <a:lnSpc>
+                <a:spcPct val="90000"/>
+              </a:lnSpc>
+            </a:pPr>
             <a:r>
-              <a:rPr lang="en-US" sz="3100">
+              <a:rPr lang="en-US" sz="4100">
                 <a:solidFill>
-                  <a:srgbClr val="FFFFFF"/>
+                  <a:schemeClr val="bg1"/>
                 </a:solidFill>
               </a:rPr>
               <a:t>Building High-Performance Data Pipelines with Go and Kubernetes</a:t>
@@ -43989,8 +43907,8 @@
         </p:nvSpPr>
         <p:spPr>
           <a:xfrm>
-            <a:off x="644271" y="4873600"/>
-            <a:ext cx="3636783" cy="1183602"/>
+            <a:off x="546497" y="3902075"/>
+            <a:ext cx="4129087" cy="1655762"/>
           </a:xfrm>
         </p:spPr>
         <p:txBody>
@@ -43999,82 +43917,55 @@
           </a:bodyPr>
           <a:lstStyle/>
           <a:p>
-            <a:pPr algn="l">
-              <a:lnSpc>
-                <a:spcPct val="90000"/>
-              </a:lnSpc>
-            </a:pPr>
+            <a:pPr algn="l"/>
             <a:r>
               <a:rPr lang="en-US" sz="1700">
                 <a:solidFill>
-                  <a:srgbClr val="FFFFFF"/>
+                  <a:schemeClr val="bg1"/>
                 </a:solidFill>
               </a:rPr>
               <a:t>A Developer’s Practical Approach</a:t>
             </a:r>
           </a:p>
           <a:p>
-            <a:pPr algn="l">
-              <a:lnSpc>
-                <a:spcPct val="90000"/>
-              </a:lnSpc>
-            </a:pPr>
+            <a:pPr algn="l"/>
             <a:r>
               <a:rPr lang="en-US" sz="1700">
                 <a:solidFill>
-                  <a:srgbClr val="FFFFFF"/>
+                  <a:schemeClr val="bg1"/>
                 </a:solidFill>
               </a:rPr>
               <a:t>Rahul S. Patil</a:t>
             </a:r>
           </a:p>
           <a:p>
-            <a:pPr algn="l">
-              <a:lnSpc>
-                <a:spcPct val="90000"/>
-              </a:lnSpc>
-            </a:pPr>
+            <a:pPr algn="l"/>
             <a:r>
               <a:rPr lang="en-US" sz="1700">
                 <a:solidFill>
-                  <a:srgbClr val="FFFFFF"/>
+                  <a:schemeClr val="bg1"/>
                 </a:solidFill>
               </a:rPr>
-              <a:t>EPAM Winter Data Meetup 2025</a:t>
-            </a:r>
-          </a:p>
-          <a:p>
-            <a:pPr algn="l">
-              <a:lnSpc>
-                <a:spcPct val="90000"/>
-              </a:lnSpc>
-            </a:pPr>
-            <a:r>
-              <a:rPr lang="en-US" sz="1700">
-                <a:solidFill>
-                  <a:srgbClr val="FFFFFF"/>
-                </a:solidFill>
-              </a:rPr>
-              <a:t>Pune, India</a:t>
+              <a:t>EPAM Data Zen Meetup 2025</a:t>
             </a:r>
           </a:p>
         </p:txBody>
       </p:sp>
-      <p:sp>
-        <p:nvSpPr>
-          <p:cNvPr id="15" name="Rectangle 14">
+      <p:cxnSp>
+        <p:nvCxnSpPr>
+          <p:cNvPr id="46" name="Straight Connector 45">
             <a:extLst>
               <a:ext uri="{FF2B5EF4-FFF2-40B4-BE49-F238E27FC236}">
-                <a16:creationId xmlns:a16="http://schemas.microsoft.com/office/drawing/2014/main" id="{6E63D1A5-FD49-4756-F62E-786C34E631EF}"/>
+                <a16:creationId xmlns:a16="http://schemas.microsoft.com/office/drawing/2014/main" id="{C41BAEC7-F7B0-4224-8B18-8F74B7D87F0B}"/>
               </a:ext>
               <a:ext uri="{C183D7F6-B498-43B3-948B-1728B52AA6E4}">
                 <adec:decorative xmlns:adec="http://schemas.microsoft.com/office/drawing/2017/decorative" val="1"/>
               </a:ext>
             </a:extLst>
           </p:cNvPr>
-          <p:cNvSpPr>
-            <a:spLocks noGrp="1" noRot="1" noChangeAspect="1" noMove="1" noResize="1" noEditPoints="1" noAdjustHandles="1" noChangeArrowheads="1" noChangeShapeType="1" noTextEdit="1"/>
-          </p:cNvSpPr>
+          <p:cNvCxnSpPr>
+            <a:cxnSpLocks noGrp="1" noRot="1" noChangeAspect="1" noMove="1" noResize="1" noEditPoints="1" noAdjustHandles="1" noChangeArrowheads="1" noChangeShapeType="1"/>
+          </p:cNvCxnSpPr>
           <p:nvPr>
             <p:extLst>
               <p:ext uri="{386F3935-93C4-4BCD-93E2-E3B085C9AB24}">
@@ -44082,65 +43973,308 @@
               </p:ext>
             </p:extLst>
           </p:nvPr>
-        </p:nvSpPr>
+        </p:nvCxnSpPr>
         <p:spPr>
-          <a:xfrm>
-            <a:off x="8405052" y="-7619"/>
-            <a:ext cx="746740" cy="6918113"/>
+          <a:xfrm flipH="1">
+            <a:off x="96438" y="3681408"/>
+            <a:ext cx="8951115" cy="0"/>
           </a:xfrm>
-          <a:prstGeom prst="rect">
+          <a:prstGeom prst="line">
             <a:avLst/>
           </a:prstGeom>
-          <a:gradFill flip="none" rotWithShape="1">
-            <a:gsLst>
-              <a:gs pos="0">
-                <a:schemeClr val="accent5">
-                  <a:alpha val="68000"/>
-                </a:schemeClr>
-              </a:gs>
-              <a:gs pos="37000">
-                <a:schemeClr val="accent5">
-                  <a:alpha val="0"/>
-                </a:schemeClr>
-              </a:gs>
-            </a:gsLst>
-            <a:lin ang="10200000" scaled="0"/>
-            <a:tileRect/>
-          </a:gradFill>
-          <a:ln>
-            <a:noFill/>
+          <a:ln w="12700">
+            <a:solidFill>
+              <a:schemeClr val="accent2"/>
+            </a:solidFill>
           </a:ln>
         </p:spPr>
         <p:style>
-          <a:lnRef idx="2">
-            <a:schemeClr val="accent1">
-              <a:shade val="50000"/>
-            </a:schemeClr>
+          <a:lnRef idx="1">
+            <a:schemeClr val="accent1"/>
           </a:lnRef>
-          <a:fillRef idx="1">
+          <a:fillRef idx="0">
             <a:schemeClr val="accent1"/>
           </a:fillRef>
           <a:effectRef idx="0">
             <a:schemeClr val="accent1"/>
           </a:effectRef>
           <a:fontRef idx="minor">
-            <a:schemeClr val="lt1"/>
+            <a:schemeClr val="tx1"/>
           </a:fontRef>
         </p:style>
-        <p:txBody>
-          <a:bodyPr rtlCol="0" anchor="ctr"/>
-          <a:lstStyle/>
-          <a:p>
-            <a:pPr algn="ctr"/>
-            <a:endParaRPr lang="en-US"/>
-          </a:p>
-        </p:txBody>
-      </p:sp>
+      </p:cxnSp>
     </p:spTree>
   </p:cSld>
   <p:clrMapOvr>
     <a:masterClrMapping/>
   </p:clrMapOvr>
+  <p:timing>
+    <p:tnLst>
+      <p:par>
+        <p:cTn id="1" dur="indefinite" restart="never" nodeType="tmRoot">
+          <p:childTnLst>
+            <p:seq concurrent="1" nextAc="seek">
+              <p:cTn id="2" dur="indefinite" nodeType="mainSeq">
+                <p:childTnLst>
+                  <p:par>
+                    <p:cTn id="3" fill="hold">
+                      <p:stCondLst>
+                        <p:cond delay="indefinite"/>
+                        <p:cond evt="onBegin" delay="0">
+                          <p:tn val="2"/>
+                        </p:cond>
+                      </p:stCondLst>
+                      <p:childTnLst>
+                        <p:par>
+                          <p:cTn id="4" fill="hold">
+                            <p:stCondLst>
+                              <p:cond delay="0"/>
+                            </p:stCondLst>
+                            <p:childTnLst>
+                              <p:par>
+                                <p:cTn id="5" presetID="10" presetClass="entr" presetSubtype="0" fill="hold" grpId="0" nodeType="withEffect">
+                                  <p:stCondLst>
+                                    <p:cond delay="1000"/>
+                                  </p:stCondLst>
+                                  <p:iterate type="lt">
+                                    <p:tmPct val="10000"/>
+                                  </p:iterate>
+                                  <p:childTnLst>
+                                    <p:set>
+                                      <p:cBhvr>
+                                        <p:cTn id="6" dur="1" fill="hold">
+                                          <p:stCondLst>
+                                            <p:cond delay="0"/>
+                                          </p:stCondLst>
+                                        </p:cTn>
+                                        <p:tgtEl>
+                                          <p:spTgt spid="2"/>
+                                        </p:tgtEl>
+                                        <p:attrNameLst>
+                                          <p:attrName>style.visibility</p:attrName>
+                                        </p:attrNameLst>
+                                      </p:cBhvr>
+                                      <p:to>
+                                        <p:strVal val="visible"/>
+                                      </p:to>
+                                    </p:set>
+                                    <p:animEffect transition="in" filter="fade">
+                                      <p:cBhvr>
+                                        <p:cTn id="7" dur="400"/>
+                                        <p:tgtEl>
+                                          <p:spTgt spid="2"/>
+                                        </p:tgtEl>
+                                      </p:cBhvr>
+                                    </p:animEffect>
+                                  </p:childTnLst>
+                                </p:cTn>
+                              </p:par>
+                              <p:par>
+                                <p:cTn id="8" presetID="10" presetClass="entr" presetSubtype="0" fill="hold" grpId="0" nodeType="withEffect">
+                                  <p:stCondLst>
+                                    <p:cond delay="2000"/>
+                                  </p:stCondLst>
+                                  <p:iterate type="lt">
+                                    <p:tmPct val="10000"/>
+                                  </p:iterate>
+                                  <p:childTnLst>
+                                    <p:set>
+                                      <p:cBhvr>
+                                        <p:cTn id="9" dur="1" fill="hold">
+                                          <p:stCondLst>
+                                            <p:cond delay="0"/>
+                                          </p:stCondLst>
+                                        </p:cTn>
+                                        <p:tgtEl>
+                                          <p:spTgt spid="3">
+                                            <p:txEl>
+                                              <p:pRg st="0" end="0"/>
+                                            </p:txEl>
+                                          </p:spTgt>
+                                        </p:tgtEl>
+                                        <p:attrNameLst>
+                                          <p:attrName>style.visibility</p:attrName>
+                                        </p:attrNameLst>
+                                      </p:cBhvr>
+                                      <p:to>
+                                        <p:strVal val="visible"/>
+                                      </p:to>
+                                    </p:set>
+                                    <p:animEffect transition="in" filter="fade">
+                                      <p:cBhvr>
+                                        <p:cTn id="10" dur="400"/>
+                                        <p:tgtEl>
+                                          <p:spTgt spid="3">
+                                            <p:txEl>
+                                              <p:pRg st="0" end="0"/>
+                                            </p:txEl>
+                                          </p:spTgt>
+                                        </p:tgtEl>
+                                      </p:cBhvr>
+                                    </p:animEffect>
+                                  </p:childTnLst>
+                                </p:cTn>
+                              </p:par>
+                            </p:childTnLst>
+                          </p:cTn>
+                        </p:par>
+                      </p:childTnLst>
+                    </p:cTn>
+                  </p:par>
+                  <p:par>
+                    <p:cTn id="11" fill="hold">
+                      <p:stCondLst>
+                        <p:cond delay="indefinite"/>
+                      </p:stCondLst>
+                      <p:childTnLst>
+                        <p:par>
+                          <p:cTn id="12" fill="hold">
+                            <p:stCondLst>
+                              <p:cond delay="0"/>
+                            </p:stCondLst>
+                            <p:childTnLst>
+                              <p:par>
+                                <p:cTn id="13" presetID="10" presetClass="entr" presetSubtype="0" fill="hold" grpId="0" nodeType="clickEffect">
+                                  <p:stCondLst>
+                                    <p:cond delay="2000"/>
+                                  </p:stCondLst>
+                                  <p:iterate type="lt">
+                                    <p:tmPct val="10000"/>
+                                  </p:iterate>
+                                  <p:childTnLst>
+                                    <p:set>
+                                      <p:cBhvr>
+                                        <p:cTn id="14" dur="1" fill="hold">
+                                          <p:stCondLst>
+                                            <p:cond delay="0"/>
+                                          </p:stCondLst>
+                                        </p:cTn>
+                                        <p:tgtEl>
+                                          <p:spTgt spid="3">
+                                            <p:txEl>
+                                              <p:pRg st="1" end="1"/>
+                                            </p:txEl>
+                                          </p:spTgt>
+                                        </p:tgtEl>
+                                        <p:attrNameLst>
+                                          <p:attrName>style.visibility</p:attrName>
+                                        </p:attrNameLst>
+                                      </p:cBhvr>
+                                      <p:to>
+                                        <p:strVal val="visible"/>
+                                      </p:to>
+                                    </p:set>
+                                    <p:animEffect transition="in" filter="fade">
+                                      <p:cBhvr>
+                                        <p:cTn id="15" dur="400"/>
+                                        <p:tgtEl>
+                                          <p:spTgt spid="3">
+                                            <p:txEl>
+                                              <p:pRg st="1" end="1"/>
+                                            </p:txEl>
+                                          </p:spTgt>
+                                        </p:tgtEl>
+                                      </p:cBhvr>
+                                    </p:animEffect>
+                                  </p:childTnLst>
+                                </p:cTn>
+                              </p:par>
+                            </p:childTnLst>
+                          </p:cTn>
+                        </p:par>
+                      </p:childTnLst>
+                    </p:cTn>
+                  </p:par>
+                  <p:par>
+                    <p:cTn id="16" fill="hold">
+                      <p:stCondLst>
+                        <p:cond delay="indefinite"/>
+                      </p:stCondLst>
+                      <p:childTnLst>
+                        <p:par>
+                          <p:cTn id="17" fill="hold">
+                            <p:stCondLst>
+                              <p:cond delay="0"/>
+                            </p:stCondLst>
+                            <p:childTnLst>
+                              <p:par>
+                                <p:cTn id="18" presetID="10" presetClass="entr" presetSubtype="0" fill="hold" grpId="0" nodeType="clickEffect">
+                                  <p:stCondLst>
+                                    <p:cond delay="2000"/>
+                                  </p:stCondLst>
+                                  <p:iterate type="lt">
+                                    <p:tmPct val="10000"/>
+                                  </p:iterate>
+                                  <p:childTnLst>
+                                    <p:set>
+                                      <p:cBhvr>
+                                        <p:cTn id="19" dur="1" fill="hold">
+                                          <p:stCondLst>
+                                            <p:cond delay="0"/>
+                                          </p:stCondLst>
+                                        </p:cTn>
+                                        <p:tgtEl>
+                                          <p:spTgt spid="3">
+                                            <p:txEl>
+                                              <p:pRg st="2" end="2"/>
+                                            </p:txEl>
+                                          </p:spTgt>
+                                        </p:tgtEl>
+                                        <p:attrNameLst>
+                                          <p:attrName>style.visibility</p:attrName>
+                                        </p:attrNameLst>
+                                      </p:cBhvr>
+                                      <p:to>
+                                        <p:strVal val="visible"/>
+                                      </p:to>
+                                    </p:set>
+                                    <p:animEffect transition="in" filter="fade">
+                                      <p:cBhvr>
+                                        <p:cTn id="20" dur="400"/>
+                                        <p:tgtEl>
+                                          <p:spTgt spid="3">
+                                            <p:txEl>
+                                              <p:pRg st="2" end="2"/>
+                                            </p:txEl>
+                                          </p:spTgt>
+                                        </p:tgtEl>
+                                      </p:cBhvr>
+                                    </p:animEffect>
+                                  </p:childTnLst>
+                                </p:cTn>
+                              </p:par>
+                            </p:childTnLst>
+                          </p:cTn>
+                        </p:par>
+                      </p:childTnLst>
+                    </p:cTn>
+                  </p:par>
+                </p:childTnLst>
+              </p:cTn>
+              <p:prevCondLst>
+                <p:cond evt="onPrev" delay="0">
+                  <p:tgtEl>
+                    <p:sldTgt/>
+                  </p:tgtEl>
+                </p:cond>
+              </p:prevCondLst>
+              <p:nextCondLst>
+                <p:cond evt="onNext" delay="0">
+                  <p:tgtEl>
+                    <p:sldTgt/>
+                  </p:tgtEl>
+                </p:cond>
+              </p:nextCondLst>
+            </p:seq>
+          </p:childTnLst>
+        </p:cTn>
+      </p:par>
+    </p:tnLst>
+    <p:bldLst>
+      <p:bldP spid="2" grpId="0"/>
+      <p:bldP spid="3" grpId="0" build="p"/>
+    </p:bldLst>
+  </p:timing>
 </p:sld>
 </file>
 

</xml_diff>